<commit_message>
mensia uprava do unit testov prezentacie
</commit_message>
<xml_diff>
--- a/unit testy.pptx
+++ b/unit testy.pptx
@@ -16,9 +16,9 @@
     <p:sldId id="261" r:id="rId10"/>
     <p:sldId id="262" r:id="rId11"/>
     <p:sldId id="263" r:id="rId12"/>
-    <p:sldId id="264" r:id="rId13"/>
-    <p:sldId id="265" r:id="rId14"/>
-    <p:sldId id="268" r:id="rId15"/>
+    <p:sldId id="273" r:id="rId13"/>
+    <p:sldId id="264" r:id="rId14"/>
+    <p:sldId id="265" r:id="rId15"/>
     <p:sldId id="266" r:id="rId16"/>
     <p:sldId id="267" r:id="rId17"/>
     <p:sldId id="272" r:id="rId18"/>
@@ -4436,7 +4436,7 @@
           <p:cNvPr id="2" name="Nadpis 1">
             <a:extLst>
               <a:ext uri="{FF2B5EF4-FFF2-40B4-BE49-F238E27FC236}">
-                <a16:creationId xmlns:a16="http://schemas.microsoft.com/office/drawing/2014/main" id="{BAEAE4CD-FAB0-64A4-2A6A-92F6FAF6796F}"/>
+                <a16:creationId xmlns:a16="http://schemas.microsoft.com/office/drawing/2014/main" id="{C6D67CD9-D481-2164-7360-CD5EA21A9A6E}"/>
               </a:ext>
             </a:extLst>
           </p:cNvPr>
@@ -4452,15 +4452,19 @@
           <a:bodyPr/>
           <a:lstStyle/>
           <a:p>
+            <a:pPr algn="ctr"/>
             <a:r>
               <a:rPr lang="sk-SK" dirty="0"/>
-              <a:t>Najpoužívanejšie metódy z triedy </a:t>
+              <a:t>Príklad </a:t>
             </a:r>
             <a:r>
               <a:rPr lang="sk-SK" dirty="0" err="1"/>
-              <a:t>Assertions</a:t>
-            </a:r>
-            <a:endParaRPr lang="sk-SK" dirty="0"/>
+              <a:t>unit</a:t>
+            </a:r>
+            <a:r>
+              <a:rPr lang="sk-SK" dirty="0"/>
+              <a:t> testovania</a:t>
+            </a:r>
           </a:p>
         </p:txBody>
       </p:sp>
@@ -4469,7 +4473,7 @@
           <p:cNvPr id="3" name="Zástupný objekt pre obsah 2">
             <a:extLst>
               <a:ext uri="{FF2B5EF4-FFF2-40B4-BE49-F238E27FC236}">
-                <a16:creationId xmlns:a16="http://schemas.microsoft.com/office/drawing/2014/main" id="{E2647D35-D2E0-BADC-FF5B-75ECEB4DD9C3}"/>
+                <a16:creationId xmlns:a16="http://schemas.microsoft.com/office/drawing/2014/main" id="{F2C2421C-AC05-9A5E-A46F-9844EC065CE4}"/>
               </a:ext>
             </a:extLst>
           </p:cNvPr>
@@ -4482,374 +4486,131 @@
         </p:nvSpPr>
         <p:spPr/>
         <p:txBody>
-          <a:bodyPr>
-            <a:normAutofit/>
-          </a:bodyPr>
+          <a:bodyPr/>
           <a:lstStyle/>
-          <a:p>
-            <a:pPr marL="342900" lvl="0" indent="-342900">
-              <a:lnSpc>
-                <a:spcPct val="106000"/>
-              </a:lnSpc>
-              <a:buFont typeface="Symbol" panose="05050102010706020507" pitchFamily="18" charset="2"/>
-              <a:buChar char=""/>
-            </a:pPr>
-            <a:r>
-              <a:rPr lang="sk-SK" sz="1800" dirty="0" err="1">
-                <a:effectLst/>
-                <a:latin typeface="Calibri" panose="020F0502020204030204" pitchFamily="34" charset="0"/>
-                <a:ea typeface="Calibri" panose="020F0502020204030204" pitchFamily="34" charset="0"/>
-                <a:cs typeface="Times New Roman" panose="02020603050405020304" pitchFamily="18" charset="0"/>
-              </a:rPr>
-              <a:t>assertTrue</a:t>
-            </a:r>
-            <a:r>
-              <a:rPr lang="sk-SK" sz="1800" dirty="0">
-                <a:effectLst/>
-                <a:latin typeface="Calibri" panose="020F0502020204030204" pitchFamily="34" charset="0"/>
-                <a:ea typeface="Calibri" panose="020F0502020204030204" pitchFamily="34" charset="0"/>
-                <a:cs typeface="Times New Roman" panose="02020603050405020304" pitchFamily="18" charset="0"/>
-              </a:rPr>
-              <a:t> </a:t>
-            </a:r>
-            <a:r>
-              <a:rPr lang="en-US" sz="1800" dirty="0">
-                <a:effectLst/>
-                <a:latin typeface="Calibri" panose="020F0502020204030204" pitchFamily="34" charset="0"/>
-                <a:ea typeface="Calibri" panose="020F0502020204030204" pitchFamily="34" charset="0"/>
-                <a:cs typeface="Times New Roman" panose="02020603050405020304" pitchFamily="18" charset="0"/>
-              </a:rPr>
-              <a:t>– Over</a:t>
-            </a:r>
-            <a:r>
-              <a:rPr lang="sk-SK" sz="1800" dirty="0">
-                <a:effectLst/>
-                <a:latin typeface="Calibri" panose="020F0502020204030204" pitchFamily="34" charset="0"/>
-                <a:ea typeface="Calibri" panose="020F0502020204030204" pitchFamily="34" charset="0"/>
-                <a:cs typeface="Times New Roman" panose="02020603050405020304" pitchFamily="18" charset="0"/>
-              </a:rPr>
-              <a:t>í</a:t>
-            </a:r>
-            <a:r>
-              <a:rPr lang="sk-SK" sz="1800" dirty="0">
-                <a:solidFill>
-                  <a:srgbClr val="22222A"/>
-                </a:solidFill>
-                <a:effectLst/>
-                <a:latin typeface="Segoe UI" panose="020B0502040204020203" pitchFamily="34" charset="0"/>
-                <a:ea typeface="Calibri" panose="020F0502020204030204" pitchFamily="34" charset="0"/>
-                <a:cs typeface="Times New Roman" panose="02020603050405020304" pitchFamily="18" charset="0"/>
-              </a:rPr>
-              <a:t> podmienku či je pravdivá</a:t>
-            </a:r>
-            <a:endParaRPr lang="sk-SK" sz="1800" dirty="0">
-              <a:effectLst/>
-              <a:latin typeface="Calibri" panose="020F0502020204030204" pitchFamily="34" charset="0"/>
-              <a:ea typeface="Calibri" panose="020F0502020204030204" pitchFamily="34" charset="0"/>
-              <a:cs typeface="Times New Roman" panose="02020603050405020304" pitchFamily="18" charset="0"/>
-            </a:endParaRPr>
-          </a:p>
-          <a:p>
-            <a:pPr marL="342900" lvl="0" indent="-342900">
-              <a:lnSpc>
-                <a:spcPct val="106000"/>
-              </a:lnSpc>
-              <a:buFont typeface="Symbol" panose="05050102010706020507" pitchFamily="18" charset="2"/>
-              <a:buChar char=""/>
-            </a:pPr>
-            <a:r>
-              <a:rPr lang="sk-SK" sz="1800" dirty="0" err="1">
-                <a:effectLst/>
-                <a:latin typeface="Calibri" panose="020F0502020204030204" pitchFamily="34" charset="0"/>
-                <a:ea typeface="Calibri" panose="020F0502020204030204" pitchFamily="34" charset="0"/>
-                <a:cs typeface="Times New Roman" panose="02020603050405020304" pitchFamily="18" charset="0"/>
-              </a:rPr>
-              <a:t>assertFalse</a:t>
-            </a:r>
-            <a:r>
-              <a:rPr lang="sk-SK" sz="1800" dirty="0">
-                <a:effectLst/>
-                <a:latin typeface="Calibri" panose="020F0502020204030204" pitchFamily="34" charset="0"/>
-                <a:ea typeface="Calibri" panose="020F0502020204030204" pitchFamily="34" charset="0"/>
-                <a:cs typeface="Times New Roman" panose="02020603050405020304" pitchFamily="18" charset="0"/>
-              </a:rPr>
-              <a:t> - O</a:t>
-            </a:r>
-            <a:r>
-              <a:rPr lang="sk-SK" sz="1800" dirty="0">
-                <a:solidFill>
-                  <a:srgbClr val="22222A"/>
-                </a:solidFill>
-                <a:effectLst/>
-                <a:latin typeface="Segoe UI" panose="020B0502040204020203" pitchFamily="34" charset="0"/>
-                <a:ea typeface="Calibri" panose="020F0502020204030204" pitchFamily="34" charset="0"/>
-                <a:cs typeface="Times New Roman" panose="02020603050405020304" pitchFamily="18" charset="0"/>
-              </a:rPr>
-              <a:t>pačná metóda k </a:t>
-            </a:r>
-            <a:r>
-              <a:rPr lang="sk-SK" sz="1800" dirty="0" err="1">
-                <a:solidFill>
-                  <a:srgbClr val="22222A"/>
-                </a:solidFill>
-                <a:effectLst/>
-                <a:latin typeface="Segoe UI" panose="020B0502040204020203" pitchFamily="34" charset="0"/>
-                <a:ea typeface="Calibri" panose="020F0502020204030204" pitchFamily="34" charset="0"/>
-                <a:cs typeface="Times New Roman" panose="02020603050405020304" pitchFamily="18" charset="0"/>
-              </a:rPr>
-              <a:t>assertTrue</a:t>
-            </a:r>
-            <a:endParaRPr lang="sk-SK" sz="1800" dirty="0">
-              <a:effectLst/>
-              <a:latin typeface="Calibri" panose="020F0502020204030204" pitchFamily="34" charset="0"/>
-              <a:ea typeface="Calibri" panose="020F0502020204030204" pitchFamily="34" charset="0"/>
-              <a:cs typeface="Times New Roman" panose="02020603050405020304" pitchFamily="18" charset="0"/>
-            </a:endParaRPr>
-          </a:p>
-          <a:p>
-            <a:pPr marL="342900" lvl="0" indent="-342900">
-              <a:lnSpc>
-                <a:spcPct val="106000"/>
-              </a:lnSpc>
-              <a:buFont typeface="Symbol" panose="05050102010706020507" pitchFamily="18" charset="2"/>
-              <a:buChar char=""/>
-            </a:pPr>
-            <a:r>
-              <a:rPr lang="sk-SK" sz="1800" dirty="0" err="1">
-                <a:effectLst/>
-                <a:latin typeface="Calibri" panose="020F0502020204030204" pitchFamily="34" charset="0"/>
-                <a:ea typeface="Calibri" panose="020F0502020204030204" pitchFamily="34" charset="0"/>
-                <a:cs typeface="Times New Roman" panose="02020603050405020304" pitchFamily="18" charset="0"/>
-              </a:rPr>
-              <a:t>assertNull</a:t>
-            </a:r>
-            <a:r>
-              <a:rPr lang="sk-SK" sz="1800" dirty="0">
-                <a:effectLst/>
-                <a:latin typeface="Calibri" panose="020F0502020204030204" pitchFamily="34" charset="0"/>
-                <a:ea typeface="Calibri" panose="020F0502020204030204" pitchFamily="34" charset="0"/>
-                <a:cs typeface="Times New Roman" panose="02020603050405020304" pitchFamily="18" charset="0"/>
-              </a:rPr>
-              <a:t> – Overí či hodnota je </a:t>
-            </a:r>
-            <a:r>
-              <a:rPr lang="sk-SK" sz="1800" dirty="0" err="1">
-                <a:effectLst/>
-                <a:latin typeface="Calibri" panose="020F0502020204030204" pitchFamily="34" charset="0"/>
-                <a:ea typeface="Calibri" panose="020F0502020204030204" pitchFamily="34" charset="0"/>
-                <a:cs typeface="Times New Roman" panose="02020603050405020304" pitchFamily="18" charset="0"/>
-              </a:rPr>
-              <a:t>null</a:t>
-            </a:r>
-            <a:endParaRPr lang="sk-SK" sz="1800" dirty="0">
-              <a:effectLst/>
-              <a:latin typeface="Calibri" panose="020F0502020204030204" pitchFamily="34" charset="0"/>
-              <a:ea typeface="Calibri" panose="020F0502020204030204" pitchFamily="34" charset="0"/>
-              <a:cs typeface="Times New Roman" panose="02020603050405020304" pitchFamily="18" charset="0"/>
-            </a:endParaRPr>
-          </a:p>
-          <a:p>
-            <a:pPr marL="342900" lvl="0" indent="-342900">
-              <a:lnSpc>
-                <a:spcPct val="106000"/>
-              </a:lnSpc>
-              <a:buFont typeface="Symbol" panose="05050102010706020507" pitchFamily="18" charset="2"/>
-              <a:buChar char=""/>
-            </a:pPr>
-            <a:r>
-              <a:rPr lang="sk-SK" sz="1800" dirty="0" err="1">
-                <a:effectLst/>
-                <a:latin typeface="Calibri" panose="020F0502020204030204" pitchFamily="34" charset="0"/>
-                <a:ea typeface="Calibri" panose="020F0502020204030204" pitchFamily="34" charset="0"/>
-                <a:cs typeface="Times New Roman" panose="02020603050405020304" pitchFamily="18" charset="0"/>
-              </a:rPr>
-              <a:t>assertNotNull</a:t>
-            </a:r>
-            <a:r>
-              <a:rPr lang="sk-SK" sz="1800" dirty="0">
-                <a:effectLst/>
-                <a:latin typeface="Calibri" panose="020F0502020204030204" pitchFamily="34" charset="0"/>
-                <a:ea typeface="Calibri" panose="020F0502020204030204" pitchFamily="34" charset="0"/>
-                <a:cs typeface="Times New Roman" panose="02020603050405020304" pitchFamily="18" charset="0"/>
-              </a:rPr>
-              <a:t> – Opačná metóda k </a:t>
-            </a:r>
-            <a:r>
-              <a:rPr lang="sk-SK" sz="1800" dirty="0" err="1">
-                <a:effectLst/>
-                <a:latin typeface="Calibri" panose="020F0502020204030204" pitchFamily="34" charset="0"/>
-                <a:ea typeface="Calibri" panose="020F0502020204030204" pitchFamily="34" charset="0"/>
-                <a:cs typeface="Times New Roman" panose="02020603050405020304" pitchFamily="18" charset="0"/>
-              </a:rPr>
-              <a:t>assertNull</a:t>
-            </a:r>
-            <a:endParaRPr lang="sk-SK" sz="1800" dirty="0">
-              <a:effectLst/>
-              <a:latin typeface="Calibri" panose="020F0502020204030204" pitchFamily="34" charset="0"/>
-              <a:ea typeface="Calibri" panose="020F0502020204030204" pitchFamily="34" charset="0"/>
-              <a:cs typeface="Times New Roman" panose="02020603050405020304" pitchFamily="18" charset="0"/>
-            </a:endParaRPr>
-          </a:p>
-          <a:p>
-            <a:pPr marL="342900" lvl="0" indent="-342900">
-              <a:lnSpc>
-                <a:spcPct val="106000"/>
-              </a:lnSpc>
-              <a:buFont typeface="Symbol" panose="05050102010706020507" pitchFamily="18" charset="2"/>
-              <a:buChar char=""/>
-            </a:pPr>
-            <a:r>
-              <a:rPr lang="sk-SK" sz="1800" dirty="0" err="1">
-                <a:effectLst/>
-                <a:latin typeface="Calibri" panose="020F0502020204030204" pitchFamily="34" charset="0"/>
-                <a:ea typeface="Calibri" panose="020F0502020204030204" pitchFamily="34" charset="0"/>
-                <a:cs typeface="Times New Roman" panose="02020603050405020304" pitchFamily="18" charset="0"/>
-              </a:rPr>
-              <a:t>assertEquals</a:t>
-            </a:r>
-            <a:r>
-              <a:rPr lang="sk-SK" sz="1800" dirty="0">
-                <a:effectLst/>
-                <a:latin typeface="Calibri" panose="020F0502020204030204" pitchFamily="34" charset="0"/>
-                <a:ea typeface="Calibri" panose="020F0502020204030204" pitchFamily="34" charset="0"/>
-                <a:cs typeface="Times New Roman" panose="02020603050405020304" pitchFamily="18" charset="0"/>
-              </a:rPr>
-              <a:t> – Overí, či dva parametre sú rovnaké</a:t>
-            </a:r>
-          </a:p>
-          <a:p>
-            <a:pPr marL="342900" lvl="0" indent="-342900">
-              <a:lnSpc>
-                <a:spcPct val="106000"/>
-              </a:lnSpc>
-              <a:buFont typeface="Symbol" panose="05050102010706020507" pitchFamily="18" charset="2"/>
-              <a:buChar char=""/>
-            </a:pPr>
-            <a:r>
-              <a:rPr lang="sk-SK" sz="1800" dirty="0" err="1">
-                <a:effectLst/>
-                <a:latin typeface="Calibri" panose="020F0502020204030204" pitchFamily="34" charset="0"/>
-                <a:ea typeface="Calibri" panose="020F0502020204030204" pitchFamily="34" charset="0"/>
-                <a:cs typeface="Times New Roman" panose="02020603050405020304" pitchFamily="18" charset="0"/>
-              </a:rPr>
-              <a:t>assertNotEquals</a:t>
-            </a:r>
-            <a:r>
-              <a:rPr lang="sk-SK" sz="1800" dirty="0">
-                <a:effectLst/>
-                <a:latin typeface="Calibri" panose="020F0502020204030204" pitchFamily="34" charset="0"/>
-                <a:ea typeface="Calibri" panose="020F0502020204030204" pitchFamily="34" charset="0"/>
-                <a:cs typeface="Times New Roman" panose="02020603050405020304" pitchFamily="18" charset="0"/>
-              </a:rPr>
-              <a:t> – Opačná metóda k </a:t>
-            </a:r>
-            <a:r>
-              <a:rPr lang="sk-SK" sz="1800" dirty="0" err="1">
-                <a:effectLst/>
-                <a:latin typeface="Calibri" panose="020F0502020204030204" pitchFamily="34" charset="0"/>
-                <a:ea typeface="Calibri" panose="020F0502020204030204" pitchFamily="34" charset="0"/>
-                <a:cs typeface="Times New Roman" panose="02020603050405020304" pitchFamily="18" charset="0"/>
-              </a:rPr>
-              <a:t>assertEquals</a:t>
-            </a:r>
-            <a:endParaRPr lang="sk-SK" sz="1800" dirty="0">
-              <a:effectLst/>
-              <a:latin typeface="Calibri" panose="020F0502020204030204" pitchFamily="34" charset="0"/>
-              <a:ea typeface="Calibri" panose="020F0502020204030204" pitchFamily="34" charset="0"/>
-              <a:cs typeface="Times New Roman" panose="02020603050405020304" pitchFamily="18" charset="0"/>
-            </a:endParaRPr>
-          </a:p>
-          <a:p>
-            <a:pPr marL="342900" lvl="0" indent="-342900">
-              <a:lnSpc>
-                <a:spcPct val="106000"/>
-              </a:lnSpc>
-              <a:buFont typeface="Symbol" panose="05050102010706020507" pitchFamily="18" charset="2"/>
-              <a:buChar char=""/>
-            </a:pPr>
-            <a:r>
-              <a:rPr lang="sk-SK" sz="1800" dirty="0" err="1">
-                <a:effectLst/>
-                <a:latin typeface="Calibri" panose="020F0502020204030204" pitchFamily="34" charset="0"/>
-                <a:ea typeface="Calibri" panose="020F0502020204030204" pitchFamily="34" charset="0"/>
-                <a:cs typeface="Times New Roman" panose="02020603050405020304" pitchFamily="18" charset="0"/>
-              </a:rPr>
-              <a:t>assertSame</a:t>
-            </a:r>
-            <a:r>
-              <a:rPr lang="sk-SK" sz="1800" dirty="0">
-                <a:effectLst/>
-                <a:latin typeface="Calibri" panose="020F0502020204030204" pitchFamily="34" charset="0"/>
-                <a:ea typeface="Calibri" panose="020F0502020204030204" pitchFamily="34" charset="0"/>
-                <a:cs typeface="Times New Roman" panose="02020603050405020304" pitchFamily="18" charset="0"/>
-              </a:rPr>
-              <a:t> – Overí, či hodnoty dvoch parametrov </a:t>
-            </a:r>
-            <a:r>
-              <a:rPr lang="sk-SK" sz="1800" dirty="0" err="1">
-                <a:effectLst/>
-                <a:latin typeface="Calibri" panose="020F0502020204030204" pitchFamily="34" charset="0"/>
-                <a:ea typeface="Calibri" panose="020F0502020204030204" pitchFamily="34" charset="0"/>
-                <a:cs typeface="Times New Roman" panose="02020603050405020304" pitchFamily="18" charset="0"/>
-              </a:rPr>
-              <a:t>referencujú</a:t>
-            </a:r>
-            <a:r>
-              <a:rPr lang="sk-SK" sz="1800" dirty="0">
-                <a:effectLst/>
-                <a:latin typeface="Calibri" panose="020F0502020204030204" pitchFamily="34" charset="0"/>
-                <a:ea typeface="Calibri" panose="020F0502020204030204" pitchFamily="34" charset="0"/>
-                <a:cs typeface="Times New Roman" panose="02020603050405020304" pitchFamily="18" charset="0"/>
-              </a:rPr>
-              <a:t> rovnaký objekt</a:t>
-            </a:r>
-          </a:p>
-          <a:p>
-            <a:pPr marL="342900" lvl="0" indent="-342900">
-              <a:lnSpc>
-                <a:spcPct val="106000"/>
-              </a:lnSpc>
-              <a:buFont typeface="Symbol" panose="05050102010706020507" pitchFamily="18" charset="2"/>
-              <a:buChar char=""/>
-            </a:pPr>
-            <a:r>
-              <a:rPr lang="sk-SK" sz="1800" dirty="0" err="1">
-                <a:effectLst/>
-                <a:latin typeface="Calibri" panose="020F0502020204030204" pitchFamily="34" charset="0"/>
-                <a:ea typeface="Calibri" panose="020F0502020204030204" pitchFamily="34" charset="0"/>
-                <a:cs typeface="Times New Roman" panose="02020603050405020304" pitchFamily="18" charset="0"/>
-              </a:rPr>
-              <a:t>assertNotSame</a:t>
-            </a:r>
-            <a:r>
-              <a:rPr lang="sk-SK" sz="1800" dirty="0">
-                <a:effectLst/>
-                <a:latin typeface="Calibri" panose="020F0502020204030204" pitchFamily="34" charset="0"/>
-                <a:ea typeface="Calibri" panose="020F0502020204030204" pitchFamily="34" charset="0"/>
-                <a:cs typeface="Times New Roman" panose="02020603050405020304" pitchFamily="18" charset="0"/>
-              </a:rPr>
-              <a:t> – Opačná metóda k </a:t>
-            </a:r>
-            <a:r>
-              <a:rPr lang="sk-SK" sz="1800" dirty="0" err="1">
-                <a:effectLst/>
-                <a:latin typeface="Calibri" panose="020F0502020204030204" pitchFamily="34" charset="0"/>
-                <a:ea typeface="Calibri" panose="020F0502020204030204" pitchFamily="34" charset="0"/>
-                <a:cs typeface="Times New Roman" panose="02020603050405020304" pitchFamily="18" charset="0"/>
-              </a:rPr>
-              <a:t>assertSame</a:t>
-            </a:r>
-            <a:endParaRPr lang="sk-SK" sz="1800" dirty="0">
-              <a:effectLst/>
-              <a:latin typeface="Calibri" panose="020F0502020204030204" pitchFamily="34" charset="0"/>
-              <a:ea typeface="Calibri" panose="020F0502020204030204" pitchFamily="34" charset="0"/>
-              <a:cs typeface="Times New Roman" panose="02020603050405020304" pitchFamily="18" charset="0"/>
-            </a:endParaRPr>
-          </a:p>
           <a:p>
             <a:pPr marL="0" indent="0">
               <a:buNone/>
             </a:pPr>
+            <a:r>
+              <a:rPr lang="sk-SK" sz="1800" dirty="0">
+                <a:effectLst/>
+                <a:latin typeface="Calibri" panose="020F0502020204030204" pitchFamily="34" charset="0"/>
+                <a:ea typeface="Calibri" panose="020F0502020204030204" pitchFamily="34" charset="0"/>
+                <a:cs typeface="Times New Roman" panose="02020603050405020304" pitchFamily="18" charset="0"/>
+              </a:rPr>
+              <a:t>Pre ukážku </a:t>
+            </a:r>
+            <a:r>
+              <a:rPr lang="sk-SK" sz="1800" dirty="0" err="1">
+                <a:effectLst/>
+                <a:latin typeface="Calibri" panose="020F0502020204030204" pitchFamily="34" charset="0"/>
+                <a:ea typeface="Calibri" panose="020F0502020204030204" pitchFamily="34" charset="0"/>
+                <a:cs typeface="Times New Roman" panose="02020603050405020304" pitchFamily="18" charset="0"/>
+              </a:rPr>
+              <a:t>unit</a:t>
+            </a:r>
+            <a:r>
+              <a:rPr lang="sk-SK" sz="1800" dirty="0">
+                <a:effectLst/>
+                <a:latin typeface="Calibri" panose="020F0502020204030204" pitchFamily="34" charset="0"/>
+                <a:ea typeface="Calibri" panose="020F0502020204030204" pitchFamily="34" charset="0"/>
+                <a:cs typeface="Times New Roman" panose="02020603050405020304" pitchFamily="18" charset="0"/>
+              </a:rPr>
+              <a:t> testovania v jave použijem knižnicu </a:t>
+            </a:r>
+            <a:r>
+              <a:rPr lang="sk-SK" sz="1800" dirty="0" err="1">
+                <a:effectLst/>
+                <a:latin typeface="Calibri" panose="020F0502020204030204" pitchFamily="34" charset="0"/>
+                <a:ea typeface="Calibri" panose="020F0502020204030204" pitchFamily="34" charset="0"/>
+                <a:cs typeface="Times New Roman" panose="02020603050405020304" pitchFamily="18" charset="0"/>
+              </a:rPr>
+              <a:t>JUnit</a:t>
+            </a:r>
+            <a:r>
+              <a:rPr lang="sk-SK" sz="1800" dirty="0">
+                <a:effectLst/>
+                <a:latin typeface="Calibri" panose="020F0502020204030204" pitchFamily="34" charset="0"/>
+                <a:ea typeface="Calibri" panose="020F0502020204030204" pitchFamily="34" charset="0"/>
+                <a:cs typeface="Times New Roman" panose="02020603050405020304" pitchFamily="18" charset="0"/>
+              </a:rPr>
+              <a:t> 5. Je to najpoužívanejší </a:t>
+            </a:r>
+            <a:r>
+              <a:rPr lang="sk-SK" sz="1800" dirty="0" err="1">
+                <a:effectLst/>
+                <a:latin typeface="Calibri" panose="020F0502020204030204" pitchFamily="34" charset="0"/>
+                <a:ea typeface="Calibri" panose="020F0502020204030204" pitchFamily="34" charset="0"/>
+                <a:cs typeface="Times New Roman" panose="02020603050405020304" pitchFamily="18" charset="0"/>
+              </a:rPr>
+              <a:t>java</a:t>
+            </a:r>
+            <a:r>
+              <a:rPr lang="sk-SK" sz="1800" dirty="0">
+                <a:effectLst/>
+                <a:latin typeface="Calibri" panose="020F0502020204030204" pitchFamily="34" charset="0"/>
+                <a:ea typeface="Calibri" panose="020F0502020204030204" pitchFamily="34" charset="0"/>
+                <a:cs typeface="Times New Roman" panose="02020603050405020304" pitchFamily="18" charset="0"/>
+              </a:rPr>
+              <a:t> </a:t>
+            </a:r>
+            <a:r>
+              <a:rPr lang="sk-SK" sz="1800" dirty="0" err="1">
+                <a:effectLst/>
+                <a:latin typeface="Calibri" panose="020F0502020204030204" pitchFamily="34" charset="0"/>
+                <a:ea typeface="Calibri" panose="020F0502020204030204" pitchFamily="34" charset="0"/>
+                <a:cs typeface="Times New Roman" panose="02020603050405020304" pitchFamily="18" charset="0"/>
+              </a:rPr>
+              <a:t>framework</a:t>
+            </a:r>
+            <a:r>
+              <a:rPr lang="sk-SK" sz="1800" dirty="0">
+                <a:effectLst/>
+                <a:latin typeface="Calibri" panose="020F0502020204030204" pitchFamily="34" charset="0"/>
+                <a:ea typeface="Calibri" panose="020F0502020204030204" pitchFamily="34" charset="0"/>
+                <a:cs typeface="Times New Roman" panose="02020603050405020304" pitchFamily="18" charset="0"/>
+              </a:rPr>
+              <a:t> pre </a:t>
+            </a:r>
+            <a:r>
+              <a:rPr lang="sk-SK" sz="1800" dirty="0" err="1">
+                <a:effectLst/>
+                <a:latin typeface="Calibri" panose="020F0502020204030204" pitchFamily="34" charset="0"/>
+                <a:ea typeface="Calibri" panose="020F0502020204030204" pitchFamily="34" charset="0"/>
+                <a:cs typeface="Times New Roman" panose="02020603050405020304" pitchFamily="18" charset="0"/>
+              </a:rPr>
+              <a:t>unit</a:t>
+            </a:r>
+            <a:r>
+              <a:rPr lang="sk-SK" sz="1800" dirty="0">
+                <a:effectLst/>
+                <a:latin typeface="Calibri" panose="020F0502020204030204" pitchFamily="34" charset="0"/>
+                <a:ea typeface="Calibri" panose="020F0502020204030204" pitchFamily="34" charset="0"/>
+                <a:cs typeface="Times New Roman" panose="02020603050405020304" pitchFamily="18" charset="0"/>
+              </a:rPr>
+              <a:t> testovanie. Pravidlá spúšťania testov definujeme pomocou anotácií a samotné testy vyhodnocujeme pomocou funkcií z triedy </a:t>
+            </a:r>
+            <a:r>
+              <a:rPr lang="sk-SK" sz="1800" dirty="0" err="1">
+                <a:effectLst/>
+                <a:latin typeface="Calibri" panose="020F0502020204030204" pitchFamily="34" charset="0"/>
+                <a:ea typeface="Calibri" panose="020F0502020204030204" pitchFamily="34" charset="0"/>
+                <a:cs typeface="Times New Roman" panose="02020603050405020304" pitchFamily="18" charset="0"/>
+              </a:rPr>
+              <a:t>Assertions</a:t>
+            </a:r>
+            <a:r>
+              <a:rPr lang="sk-SK" sz="1800" dirty="0">
+                <a:effectLst/>
+                <a:latin typeface="Calibri" panose="020F0502020204030204" pitchFamily="34" charset="0"/>
+                <a:ea typeface="Calibri" panose="020F0502020204030204" pitchFamily="34" charset="0"/>
+                <a:cs typeface="Times New Roman" panose="02020603050405020304" pitchFamily="18" charset="0"/>
+              </a:rPr>
+              <a:t>.</a:t>
+            </a:r>
+          </a:p>
+          <a:p>
             <a:endParaRPr lang="sk-SK" dirty="0"/>
           </a:p>
         </p:txBody>
@@ -4857,7 +4618,7 @@
     </p:spTree>
     <p:extLst>
       <p:ext uri="{BB962C8B-B14F-4D97-AF65-F5344CB8AC3E}">
-        <p14:creationId xmlns:p14="http://schemas.microsoft.com/office/powerpoint/2010/main" val="135163515"/>
+        <p14:creationId xmlns:p14="http://schemas.microsoft.com/office/powerpoint/2010/main" val="209640787"/>
       </p:ext>
     </p:extLst>
   </p:cSld>
@@ -4911,7 +4672,7 @@
             </a:r>
             <a:r>
               <a:rPr lang="sk-SK" dirty="0" err="1"/>
-              <a:t>assertions</a:t>
+              <a:t>Assertions</a:t>
             </a:r>
             <a:endParaRPr lang="sk-SK" dirty="0"/>
           </a:p>
@@ -4954,35 +4715,53 @@
                 <a:ea typeface="Calibri" panose="020F0502020204030204" pitchFamily="34" charset="0"/>
                 <a:cs typeface="Times New Roman" panose="02020603050405020304" pitchFamily="18" charset="0"/>
               </a:rPr>
-              <a:t>assertLinesMatch</a:t>
-            </a:r>
-            <a:r>
-              <a:rPr lang="sk-SK" sz="1800" dirty="0">
-                <a:effectLst/>
-                <a:latin typeface="Calibri" panose="020F0502020204030204" pitchFamily="34" charset="0"/>
-                <a:ea typeface="Calibri" panose="020F0502020204030204" pitchFamily="34" charset="0"/>
-                <a:cs typeface="Times New Roman" panose="02020603050405020304" pitchFamily="18" charset="0"/>
-              </a:rPr>
-              <a:t> – Overí, či dva listy </a:t>
-            </a:r>
-            <a:r>
-              <a:rPr lang="sk-SK" sz="1800" dirty="0" err="1">
-                <a:effectLst/>
-                <a:latin typeface="Calibri" panose="020F0502020204030204" pitchFamily="34" charset="0"/>
-                <a:ea typeface="Calibri" panose="020F0502020204030204" pitchFamily="34" charset="0"/>
-                <a:cs typeface="Times New Roman" panose="02020603050405020304" pitchFamily="18" charset="0"/>
-              </a:rPr>
-              <a:t>stringov</a:t>
-            </a:r>
-            <a:r>
-              <a:rPr lang="sk-SK" sz="1800" dirty="0">
-                <a:effectLst/>
-                <a:latin typeface="Calibri" panose="020F0502020204030204" pitchFamily="34" charset="0"/>
-                <a:ea typeface="Calibri" panose="020F0502020204030204" pitchFamily="34" charset="0"/>
-                <a:cs typeface="Times New Roman" panose="02020603050405020304" pitchFamily="18" charset="0"/>
-              </a:rPr>
-              <a:t> sú rovnaké</a:t>
-            </a:r>
+              <a:t>assertTrue</a:t>
+            </a:r>
+            <a:r>
+              <a:rPr lang="sk-SK" sz="1800" dirty="0">
+                <a:effectLst/>
+                <a:latin typeface="Calibri" panose="020F0502020204030204" pitchFamily="34" charset="0"/>
+                <a:ea typeface="Calibri" panose="020F0502020204030204" pitchFamily="34" charset="0"/>
+                <a:cs typeface="Times New Roman" panose="02020603050405020304" pitchFamily="18" charset="0"/>
+              </a:rPr>
+              <a:t> </a:t>
+            </a:r>
+            <a:r>
+              <a:rPr lang="en-US" sz="1800" dirty="0">
+                <a:effectLst/>
+                <a:latin typeface="Calibri" panose="020F0502020204030204" pitchFamily="34" charset="0"/>
+                <a:ea typeface="Calibri" panose="020F0502020204030204" pitchFamily="34" charset="0"/>
+                <a:cs typeface="Times New Roman" panose="02020603050405020304" pitchFamily="18" charset="0"/>
+              </a:rPr>
+              <a:t>– Over</a:t>
+            </a:r>
+            <a:r>
+              <a:rPr lang="sk-SK" sz="1800" dirty="0">
+                <a:effectLst/>
+                <a:latin typeface="Calibri" panose="020F0502020204030204" pitchFamily="34" charset="0"/>
+                <a:ea typeface="Calibri" panose="020F0502020204030204" pitchFamily="34" charset="0"/>
+                <a:cs typeface="Times New Roman" panose="02020603050405020304" pitchFamily="18" charset="0"/>
+              </a:rPr>
+              <a:t>í</a:t>
+            </a:r>
+            <a:r>
+              <a:rPr lang="sk-SK" sz="1800" dirty="0">
+                <a:solidFill>
+                  <a:srgbClr val="22222A"/>
+                </a:solidFill>
+                <a:effectLst/>
+                <a:latin typeface="Segoe UI" panose="020B0502040204020203" pitchFamily="34" charset="0"/>
+                <a:ea typeface="Calibri" panose="020F0502020204030204" pitchFamily="34" charset="0"/>
+                <a:cs typeface="Times New Roman" panose="02020603050405020304" pitchFamily="18" charset="0"/>
+              </a:rPr>
+              <a:t> podmienku či je pravdivá</a:t>
+            </a:r>
+            <a:endParaRPr lang="sk-SK" sz="1800" dirty="0">
+              <a:effectLst/>
+              <a:latin typeface="Calibri" panose="020F0502020204030204" pitchFamily="34" charset="0"/>
+              <a:ea typeface="Calibri" panose="020F0502020204030204" pitchFamily="34" charset="0"/>
+              <a:cs typeface="Times New Roman" panose="02020603050405020304" pitchFamily="18" charset="0"/>
+            </a:endParaRPr>
           </a:p>
           <a:p>
             <a:pPr marL="342900" lvl="0" indent="-342900">
@@ -4999,17 +4778,47 @@
                 <a:ea typeface="Calibri" panose="020F0502020204030204" pitchFamily="34" charset="0"/>
                 <a:cs typeface="Times New Roman" panose="02020603050405020304" pitchFamily="18" charset="0"/>
               </a:rPr>
-              <a:t>assertArrayEquals</a:t>
-            </a:r>
-            <a:r>
-              <a:rPr lang="sk-SK" sz="1800" dirty="0">
-                <a:effectLst/>
-                <a:latin typeface="Calibri" panose="020F0502020204030204" pitchFamily="34" charset="0"/>
-                <a:ea typeface="Calibri" panose="020F0502020204030204" pitchFamily="34" charset="0"/>
-                <a:cs typeface="Times New Roman" panose="02020603050405020304" pitchFamily="18" charset="0"/>
-              </a:rPr>
-              <a:t> – Overí, či dve polia sú rovnaké</a:t>
-            </a:r>
+              <a:t>assertFalse</a:t>
+            </a:r>
+            <a:r>
+              <a:rPr lang="sk-SK" sz="1800" dirty="0">
+                <a:effectLst/>
+                <a:latin typeface="Calibri" panose="020F0502020204030204" pitchFamily="34" charset="0"/>
+                <a:ea typeface="Calibri" panose="020F0502020204030204" pitchFamily="34" charset="0"/>
+                <a:cs typeface="Times New Roman" panose="02020603050405020304" pitchFamily="18" charset="0"/>
+              </a:rPr>
+              <a:t> - O</a:t>
+            </a:r>
+            <a:r>
+              <a:rPr lang="sk-SK" sz="1800" dirty="0">
+                <a:solidFill>
+                  <a:srgbClr val="22222A"/>
+                </a:solidFill>
+                <a:effectLst/>
+                <a:latin typeface="Segoe UI" panose="020B0502040204020203" pitchFamily="34" charset="0"/>
+                <a:ea typeface="Calibri" panose="020F0502020204030204" pitchFamily="34" charset="0"/>
+                <a:cs typeface="Times New Roman" panose="02020603050405020304" pitchFamily="18" charset="0"/>
+              </a:rPr>
+              <a:t>pačná metóda k </a:t>
+            </a:r>
+            <a:r>
+              <a:rPr lang="sk-SK" sz="1800" dirty="0" err="1">
+                <a:solidFill>
+                  <a:srgbClr val="22222A"/>
+                </a:solidFill>
+                <a:effectLst/>
+                <a:latin typeface="Segoe UI" panose="020B0502040204020203" pitchFamily="34" charset="0"/>
+                <a:ea typeface="Calibri" panose="020F0502020204030204" pitchFamily="34" charset="0"/>
+                <a:cs typeface="Times New Roman" panose="02020603050405020304" pitchFamily="18" charset="0"/>
+              </a:rPr>
+              <a:t>assertTrue</a:t>
+            </a:r>
+            <a:endParaRPr lang="sk-SK" sz="1800" dirty="0">
+              <a:effectLst/>
+              <a:latin typeface="Calibri" panose="020F0502020204030204" pitchFamily="34" charset="0"/>
+              <a:ea typeface="Calibri" panose="020F0502020204030204" pitchFamily="34" charset="0"/>
+              <a:cs typeface="Times New Roman" panose="02020603050405020304" pitchFamily="18" charset="0"/>
+            </a:endParaRPr>
           </a:p>
           <a:p>
             <a:pPr marL="342900" lvl="0" indent="-342900">
@@ -5026,16 +4835,16 @@
                 <a:ea typeface="Calibri" panose="020F0502020204030204" pitchFamily="34" charset="0"/>
                 <a:cs typeface="Times New Roman" panose="02020603050405020304" pitchFamily="18" charset="0"/>
               </a:rPr>
-              <a:t>assertIterableEquals</a:t>
-            </a:r>
-            <a:r>
-              <a:rPr lang="sk-SK" sz="1800" dirty="0">
-                <a:effectLst/>
-                <a:latin typeface="Calibri" panose="020F0502020204030204" pitchFamily="34" charset="0"/>
-                <a:ea typeface="Calibri" panose="020F0502020204030204" pitchFamily="34" charset="0"/>
-                <a:cs typeface="Times New Roman" panose="02020603050405020304" pitchFamily="18" charset="0"/>
-              </a:rPr>
-              <a:t> – Overí, či dva </a:t>
+              <a:t>assertNull</a:t>
+            </a:r>
+            <a:r>
+              <a:rPr lang="sk-SK" sz="1800" dirty="0">
+                <a:effectLst/>
+                <a:latin typeface="Calibri" panose="020F0502020204030204" pitchFamily="34" charset="0"/>
+                <a:ea typeface="Calibri" panose="020F0502020204030204" pitchFamily="34" charset="0"/>
+                <a:cs typeface="Times New Roman" panose="02020603050405020304" pitchFamily="18" charset="0"/>
+              </a:rPr>
+              <a:t> – Overí či hodnota je </a:t>
             </a:r>
             <a:r>
               <a:rPr lang="sk-SK" sz="1800" dirty="0" err="1">
@@ -5044,17 +4853,14 @@
                 <a:ea typeface="Calibri" panose="020F0502020204030204" pitchFamily="34" charset="0"/>
                 <a:cs typeface="Times New Roman" panose="02020603050405020304" pitchFamily="18" charset="0"/>
               </a:rPr>
-              <a:t>iterable</a:t>
-            </a:r>
-            <a:r>
-              <a:rPr lang="sk-SK" sz="1800" dirty="0">
-                <a:effectLst/>
-                <a:latin typeface="Calibri" panose="020F0502020204030204" pitchFamily="34" charset="0"/>
-                <a:ea typeface="Calibri" panose="020F0502020204030204" pitchFamily="34" charset="0"/>
-                <a:cs typeface="Times New Roman" panose="02020603050405020304" pitchFamily="18" charset="0"/>
-              </a:rPr>
-              <a:t> sú rovnaké</a:t>
-            </a:r>
+              <a:t>null</a:t>
+            </a:r>
+            <a:endParaRPr lang="sk-SK" sz="1800" dirty="0">
+              <a:effectLst/>
+              <a:latin typeface="Calibri" panose="020F0502020204030204" pitchFamily="34" charset="0"/>
+              <a:ea typeface="Calibri" panose="020F0502020204030204" pitchFamily="34" charset="0"/>
+              <a:cs typeface="Times New Roman" panose="02020603050405020304" pitchFamily="18" charset="0"/>
+            </a:endParaRPr>
           </a:p>
           <a:p>
             <a:pPr marL="342900" lvl="0" indent="-342900">
@@ -5071,17 +4877,32 @@
                 <a:ea typeface="Calibri" panose="020F0502020204030204" pitchFamily="34" charset="0"/>
                 <a:cs typeface="Times New Roman" panose="02020603050405020304" pitchFamily="18" charset="0"/>
               </a:rPr>
-              <a:t>assertThrows</a:t>
-            </a:r>
-            <a:r>
-              <a:rPr lang="sk-SK" sz="1800" dirty="0">
-                <a:effectLst/>
-                <a:latin typeface="Calibri" panose="020F0502020204030204" pitchFamily="34" charset="0"/>
-                <a:ea typeface="Calibri" panose="020F0502020204030204" pitchFamily="34" charset="0"/>
-                <a:cs typeface="Times New Roman" panose="02020603050405020304" pitchFamily="18" charset="0"/>
-              </a:rPr>
-              <a:t> – Overí, či funkcia na vstupe vyhodí správnu výnimku</a:t>
-            </a:r>
+              <a:t>assertNotNull</a:t>
+            </a:r>
+            <a:r>
+              <a:rPr lang="sk-SK" sz="1800" dirty="0">
+                <a:effectLst/>
+                <a:latin typeface="Calibri" panose="020F0502020204030204" pitchFamily="34" charset="0"/>
+                <a:ea typeface="Calibri" panose="020F0502020204030204" pitchFamily="34" charset="0"/>
+                <a:cs typeface="Times New Roman" panose="02020603050405020304" pitchFamily="18" charset="0"/>
+              </a:rPr>
+              <a:t> – Opačná metóda k </a:t>
+            </a:r>
+            <a:r>
+              <a:rPr lang="sk-SK" sz="1800" dirty="0" err="1">
+                <a:effectLst/>
+                <a:latin typeface="Calibri" panose="020F0502020204030204" pitchFamily="34" charset="0"/>
+                <a:ea typeface="Calibri" panose="020F0502020204030204" pitchFamily="34" charset="0"/>
+                <a:cs typeface="Times New Roman" panose="02020603050405020304" pitchFamily="18" charset="0"/>
+              </a:rPr>
+              <a:t>assertNull</a:t>
+            </a:r>
+            <a:endParaRPr lang="sk-SK" sz="1800" dirty="0">
+              <a:effectLst/>
+              <a:latin typeface="Calibri" panose="020F0502020204030204" pitchFamily="34" charset="0"/>
+              <a:ea typeface="Calibri" panose="020F0502020204030204" pitchFamily="34" charset="0"/>
+              <a:cs typeface="Times New Roman" panose="02020603050405020304" pitchFamily="18" charset="0"/>
+            </a:endParaRPr>
           </a:p>
           <a:p>
             <a:pPr marL="342900" lvl="0" indent="-342900">
@@ -5098,32 +4919,17 @@
                 <a:ea typeface="Calibri" panose="020F0502020204030204" pitchFamily="34" charset="0"/>
                 <a:cs typeface="Times New Roman" panose="02020603050405020304" pitchFamily="18" charset="0"/>
               </a:rPr>
-              <a:t>assertDoesNotThrow</a:t>
-            </a:r>
-            <a:r>
-              <a:rPr lang="sk-SK" sz="1800" dirty="0">
-                <a:effectLst/>
-                <a:latin typeface="Calibri" panose="020F0502020204030204" pitchFamily="34" charset="0"/>
-                <a:ea typeface="Calibri" panose="020F0502020204030204" pitchFamily="34" charset="0"/>
-                <a:cs typeface="Times New Roman" panose="02020603050405020304" pitchFamily="18" charset="0"/>
-              </a:rPr>
-              <a:t> – Opačná metóda k </a:t>
-            </a:r>
-            <a:r>
-              <a:rPr lang="sk-SK" sz="1800" dirty="0" err="1">
-                <a:effectLst/>
-                <a:latin typeface="Calibri" panose="020F0502020204030204" pitchFamily="34" charset="0"/>
-                <a:ea typeface="Calibri" panose="020F0502020204030204" pitchFamily="34" charset="0"/>
-                <a:cs typeface="Times New Roman" panose="02020603050405020304" pitchFamily="18" charset="0"/>
-              </a:rPr>
-              <a:t>assertThrows</a:t>
-            </a:r>
-            <a:endParaRPr lang="sk-SK" sz="1800" dirty="0">
-              <a:effectLst/>
-              <a:latin typeface="Calibri" panose="020F0502020204030204" pitchFamily="34" charset="0"/>
-              <a:ea typeface="Calibri" panose="020F0502020204030204" pitchFamily="34" charset="0"/>
-              <a:cs typeface="Times New Roman" panose="02020603050405020304" pitchFamily="18" charset="0"/>
-            </a:endParaRPr>
+              <a:t>assertEquals</a:t>
+            </a:r>
+            <a:r>
+              <a:rPr lang="sk-SK" sz="1800" dirty="0">
+                <a:effectLst/>
+                <a:latin typeface="Calibri" panose="020F0502020204030204" pitchFamily="34" charset="0"/>
+                <a:ea typeface="Calibri" panose="020F0502020204030204" pitchFamily="34" charset="0"/>
+                <a:cs typeface="Times New Roman" panose="02020603050405020304" pitchFamily="18" charset="0"/>
+              </a:rPr>
+              <a:t> – Overí, či dva parametre sú rovnaké</a:t>
+            </a:r>
           </a:p>
           <a:p>
             <a:pPr marL="342900" lvl="0" indent="-342900">
@@ -5140,16 +4946,16 @@
                 <a:ea typeface="Calibri" panose="020F0502020204030204" pitchFamily="34" charset="0"/>
                 <a:cs typeface="Times New Roman" panose="02020603050405020304" pitchFamily="18" charset="0"/>
               </a:rPr>
-              <a:t>assertTimeout</a:t>
-            </a:r>
-            <a:r>
-              <a:rPr lang="sk-SK" sz="1800" dirty="0">
-                <a:effectLst/>
-                <a:latin typeface="Calibri" panose="020F0502020204030204" pitchFamily="34" charset="0"/>
-                <a:ea typeface="Calibri" panose="020F0502020204030204" pitchFamily="34" charset="0"/>
-                <a:cs typeface="Times New Roman" panose="02020603050405020304" pitchFamily="18" charset="0"/>
-              </a:rPr>
-              <a:t> – Overí, či vstupná funkcia skončí pred špecifikovaným </a:t>
+              <a:t>assertNotEquals</a:t>
+            </a:r>
+            <a:r>
+              <a:rPr lang="sk-SK" sz="1800" dirty="0">
+                <a:effectLst/>
+                <a:latin typeface="Calibri" panose="020F0502020204030204" pitchFamily="34" charset="0"/>
+                <a:ea typeface="Calibri" panose="020F0502020204030204" pitchFamily="34" charset="0"/>
+                <a:cs typeface="Times New Roman" panose="02020603050405020304" pitchFamily="18" charset="0"/>
+              </a:rPr>
+              <a:t> – Opačná metóda k </a:t>
             </a:r>
             <a:r>
               <a:rPr lang="sk-SK" sz="1800" dirty="0" err="1">
@@ -5158,7 +4964,7 @@
                 <a:ea typeface="Calibri" panose="020F0502020204030204" pitchFamily="34" charset="0"/>
                 <a:cs typeface="Times New Roman" panose="02020603050405020304" pitchFamily="18" charset="0"/>
               </a:rPr>
-              <a:t>timeoutom</a:t>
+              <a:t>assertEquals</a:t>
             </a:r>
             <a:endParaRPr lang="sk-SK" sz="1800" dirty="0">
               <a:effectLst/>
@@ -5182,16 +4988,16 @@
                 <a:ea typeface="Calibri" panose="020F0502020204030204" pitchFamily="34" charset="0"/>
                 <a:cs typeface="Times New Roman" panose="02020603050405020304" pitchFamily="18" charset="0"/>
               </a:rPr>
-              <a:t>assertAll</a:t>
-            </a:r>
-            <a:r>
-              <a:rPr lang="sk-SK" sz="1800" dirty="0">
-                <a:effectLst/>
-                <a:latin typeface="Calibri" panose="020F0502020204030204" pitchFamily="34" charset="0"/>
-                <a:ea typeface="Calibri" panose="020F0502020204030204" pitchFamily="34" charset="0"/>
-                <a:cs typeface="Times New Roman" panose="02020603050405020304" pitchFamily="18" charset="0"/>
-              </a:rPr>
-              <a:t> – Táto funkcia umožňuje vytvorenie skupinových </a:t>
+              <a:t>assertSame</a:t>
+            </a:r>
+            <a:r>
+              <a:rPr lang="sk-SK" sz="1800" dirty="0">
+                <a:effectLst/>
+                <a:latin typeface="Calibri" panose="020F0502020204030204" pitchFamily="34" charset="0"/>
+                <a:ea typeface="Calibri" panose="020F0502020204030204" pitchFamily="34" charset="0"/>
+                <a:cs typeface="Times New Roman" panose="02020603050405020304" pitchFamily="18" charset="0"/>
+              </a:rPr>
+              <a:t> – Overí, či hodnoty dvoch parametrov </a:t>
             </a:r>
             <a:r>
               <a:rPr lang="sk-SK" sz="1800" dirty="0" err="1">
@@ -5200,34 +5006,16 @@
                 <a:ea typeface="Calibri" panose="020F0502020204030204" pitchFamily="34" charset="0"/>
                 <a:cs typeface="Times New Roman" panose="02020603050405020304" pitchFamily="18" charset="0"/>
               </a:rPr>
-              <a:t>asertions</a:t>
-            </a:r>
-            <a:r>
-              <a:rPr lang="sk-SK" sz="1800" dirty="0">
-                <a:effectLst/>
-                <a:latin typeface="Calibri" panose="020F0502020204030204" pitchFamily="34" charset="0"/>
-                <a:ea typeface="Calibri" panose="020F0502020204030204" pitchFamily="34" charset="0"/>
-                <a:cs typeface="Times New Roman" panose="02020603050405020304" pitchFamily="18" charset="0"/>
-              </a:rPr>
-              <a:t>, kde sa spustí každá </a:t>
-            </a:r>
-            <a:r>
-              <a:rPr lang="sk-SK" sz="1800" dirty="0" err="1">
-                <a:effectLst/>
-                <a:latin typeface="Calibri" panose="020F0502020204030204" pitchFamily="34" charset="0"/>
-                <a:ea typeface="Calibri" panose="020F0502020204030204" pitchFamily="34" charset="0"/>
-                <a:cs typeface="Times New Roman" panose="02020603050405020304" pitchFamily="18" charset="0"/>
-              </a:rPr>
-              <a:t>assertion</a:t>
-            </a:r>
-            <a:r>
-              <a:rPr lang="sk-SK" sz="1800" dirty="0">
-                <a:effectLst/>
-                <a:latin typeface="Calibri" panose="020F0502020204030204" pitchFamily="34" charset="0"/>
-                <a:ea typeface="Calibri" panose="020F0502020204030204" pitchFamily="34" charset="0"/>
-                <a:cs typeface="Times New Roman" panose="02020603050405020304" pitchFamily="18" charset="0"/>
-              </a:rPr>
-              <a:t> a ich zlyhania sú hlásené spoločne.</a:t>
+              <a:t>referencujú</a:t>
+            </a:r>
+            <a:r>
+              <a:rPr lang="sk-SK" sz="1800" dirty="0">
+                <a:effectLst/>
+                <a:latin typeface="Calibri" panose="020F0502020204030204" pitchFamily="34" charset="0"/>
+                <a:ea typeface="Calibri" panose="020F0502020204030204" pitchFamily="34" charset="0"/>
+                <a:cs typeface="Times New Roman" panose="02020603050405020304" pitchFamily="18" charset="0"/>
+              </a:rPr>
+              <a:t> rovnaký objekt</a:t>
             </a:r>
           </a:p>
           <a:p>
@@ -5235,9 +5023,6 @@
               <a:lnSpc>
                 <a:spcPct val="106000"/>
               </a:lnSpc>
-              <a:spcAft>
-                <a:spcPts val="800"/>
-              </a:spcAft>
               <a:buFont typeface="Symbol" panose="05050102010706020507" pitchFamily="18" charset="2"/>
               <a:buChar char=""/>
             </a:pPr>
@@ -5248,19 +5033,37 @@
                 <a:ea typeface="Calibri" panose="020F0502020204030204" pitchFamily="34" charset="0"/>
                 <a:cs typeface="Times New Roman" panose="02020603050405020304" pitchFamily="18" charset="0"/>
               </a:rPr>
-              <a:t>fail</a:t>
-            </a:r>
-            <a:r>
-              <a:rPr lang="sk-SK" sz="1800" dirty="0">
-                <a:effectLst/>
-                <a:latin typeface="Calibri" panose="020F0502020204030204" pitchFamily="34" charset="0"/>
-                <a:ea typeface="Calibri" panose="020F0502020204030204" pitchFamily="34" charset="0"/>
-                <a:cs typeface="Times New Roman" panose="02020603050405020304" pitchFamily="18" charset="0"/>
-              </a:rPr>
-              <a:t> – táto metóda spôsobí zlyhanie testu</a:t>
-            </a:r>
-          </a:p>
-          <a:p>
+              <a:t>assertNotSame</a:t>
+            </a:r>
+            <a:r>
+              <a:rPr lang="sk-SK" sz="1800" dirty="0">
+                <a:effectLst/>
+                <a:latin typeface="Calibri" panose="020F0502020204030204" pitchFamily="34" charset="0"/>
+                <a:ea typeface="Calibri" panose="020F0502020204030204" pitchFamily="34" charset="0"/>
+                <a:cs typeface="Times New Roman" panose="02020603050405020304" pitchFamily="18" charset="0"/>
+              </a:rPr>
+              <a:t> – Opačná metóda k </a:t>
+            </a:r>
+            <a:r>
+              <a:rPr lang="sk-SK" sz="1800" dirty="0" err="1">
+                <a:effectLst/>
+                <a:latin typeface="Calibri" panose="020F0502020204030204" pitchFamily="34" charset="0"/>
+                <a:ea typeface="Calibri" panose="020F0502020204030204" pitchFamily="34" charset="0"/>
+                <a:cs typeface="Times New Roman" panose="02020603050405020304" pitchFamily="18" charset="0"/>
+              </a:rPr>
+              <a:t>assertSame</a:t>
+            </a:r>
+            <a:endParaRPr lang="sk-SK" sz="1800" dirty="0">
+              <a:effectLst/>
+              <a:latin typeface="Calibri" panose="020F0502020204030204" pitchFamily="34" charset="0"/>
+              <a:ea typeface="Calibri" panose="020F0502020204030204" pitchFamily="34" charset="0"/>
+              <a:cs typeface="Times New Roman" panose="02020603050405020304" pitchFamily="18" charset="0"/>
+            </a:endParaRPr>
+          </a:p>
+          <a:p>
+            <a:pPr marL="0" indent="0">
+              <a:buNone/>
+            </a:pPr>
             <a:endParaRPr lang="sk-SK" dirty="0"/>
           </a:p>
         </p:txBody>
@@ -5268,7 +5071,7 @@
     </p:spTree>
     <p:extLst>
       <p:ext uri="{BB962C8B-B14F-4D97-AF65-F5344CB8AC3E}">
-        <p14:creationId xmlns:p14="http://schemas.microsoft.com/office/powerpoint/2010/main" val="2649344561"/>
+        <p14:creationId xmlns:p14="http://schemas.microsoft.com/office/powerpoint/2010/main" val="135163515"/>
       </p:ext>
     </p:extLst>
   </p:cSld>
@@ -5300,7 +5103,7 @@
           <p:cNvPr id="2" name="Nadpis 1">
             <a:extLst>
               <a:ext uri="{FF2B5EF4-FFF2-40B4-BE49-F238E27FC236}">
-                <a16:creationId xmlns:a16="http://schemas.microsoft.com/office/drawing/2014/main" id="{BF3974F8-131B-E181-B894-8C7318137AC7}"/>
+                <a16:creationId xmlns:a16="http://schemas.microsoft.com/office/drawing/2014/main" id="{BAEAE4CD-FAB0-64A4-2A6A-92F6FAF6796F}"/>
               </a:ext>
             </a:extLst>
           </p:cNvPr>
@@ -5311,36 +5114,375 @@
             <p:ph type="title"/>
           </p:nvPr>
         </p:nvSpPr>
-        <p:spPr>
-          <a:xfrm>
-            <a:off x="838200" y="2766218"/>
-            <a:ext cx="10515600" cy="1325563"/>
-          </a:xfrm>
-        </p:spPr>
+        <p:spPr/>
         <p:txBody>
           <a:bodyPr/>
           <a:lstStyle/>
           <a:p>
-            <a:pPr algn="ctr"/>
             <a:r>
               <a:rPr lang="sk-SK" dirty="0"/>
-              <a:t>Príklad </a:t>
+              <a:t>Najpoužívanejšie metódy z triedy </a:t>
             </a:r>
             <a:r>
               <a:rPr lang="sk-SK" dirty="0" err="1"/>
-              <a:t>unit</a:t>
-            </a:r>
-            <a:r>
-              <a:rPr lang="sk-SK" dirty="0"/>
-              <a:t> testovania</a:t>
-            </a:r>
+              <a:t>assertions</a:t>
+            </a:r>
+            <a:endParaRPr lang="sk-SK" dirty="0"/>
+          </a:p>
+        </p:txBody>
+      </p:sp>
+      <p:sp>
+        <p:nvSpPr>
+          <p:cNvPr id="3" name="Zástupný objekt pre obsah 2">
+            <a:extLst>
+              <a:ext uri="{FF2B5EF4-FFF2-40B4-BE49-F238E27FC236}">
+                <a16:creationId xmlns:a16="http://schemas.microsoft.com/office/drawing/2014/main" id="{E2647D35-D2E0-BADC-FF5B-75ECEB4DD9C3}"/>
+              </a:ext>
+            </a:extLst>
+          </p:cNvPr>
+          <p:cNvSpPr>
+            <a:spLocks noGrp="1"/>
+          </p:cNvSpPr>
+          <p:nvPr>
+            <p:ph idx="1"/>
+          </p:nvPr>
+        </p:nvSpPr>
+        <p:spPr/>
+        <p:txBody>
+          <a:bodyPr>
+            <a:normAutofit/>
+          </a:bodyPr>
+          <a:lstStyle/>
+          <a:p>
+            <a:pPr marL="342900" lvl="0" indent="-342900">
+              <a:lnSpc>
+                <a:spcPct val="106000"/>
+              </a:lnSpc>
+              <a:buFont typeface="Symbol" panose="05050102010706020507" pitchFamily="18" charset="2"/>
+              <a:buChar char=""/>
+            </a:pPr>
+            <a:r>
+              <a:rPr lang="sk-SK" sz="1800" dirty="0" err="1">
+                <a:effectLst/>
+                <a:latin typeface="Calibri" panose="020F0502020204030204" pitchFamily="34" charset="0"/>
+                <a:ea typeface="Calibri" panose="020F0502020204030204" pitchFamily="34" charset="0"/>
+                <a:cs typeface="Times New Roman" panose="02020603050405020304" pitchFamily="18" charset="0"/>
+              </a:rPr>
+              <a:t>assertLinesMatch</a:t>
+            </a:r>
+            <a:r>
+              <a:rPr lang="sk-SK" sz="1800" dirty="0">
+                <a:effectLst/>
+                <a:latin typeface="Calibri" panose="020F0502020204030204" pitchFamily="34" charset="0"/>
+                <a:ea typeface="Calibri" panose="020F0502020204030204" pitchFamily="34" charset="0"/>
+                <a:cs typeface="Times New Roman" panose="02020603050405020304" pitchFamily="18" charset="0"/>
+              </a:rPr>
+              <a:t> – Overí, či dva listy </a:t>
+            </a:r>
+            <a:r>
+              <a:rPr lang="sk-SK" sz="1800" dirty="0" err="1">
+                <a:effectLst/>
+                <a:latin typeface="Calibri" panose="020F0502020204030204" pitchFamily="34" charset="0"/>
+                <a:ea typeface="Calibri" panose="020F0502020204030204" pitchFamily="34" charset="0"/>
+                <a:cs typeface="Times New Roman" panose="02020603050405020304" pitchFamily="18" charset="0"/>
+              </a:rPr>
+              <a:t>stringov</a:t>
+            </a:r>
+            <a:r>
+              <a:rPr lang="sk-SK" sz="1800" dirty="0">
+                <a:effectLst/>
+                <a:latin typeface="Calibri" panose="020F0502020204030204" pitchFamily="34" charset="0"/>
+                <a:ea typeface="Calibri" panose="020F0502020204030204" pitchFamily="34" charset="0"/>
+                <a:cs typeface="Times New Roman" panose="02020603050405020304" pitchFamily="18" charset="0"/>
+              </a:rPr>
+              <a:t> sú rovnaké</a:t>
+            </a:r>
+          </a:p>
+          <a:p>
+            <a:pPr marL="342900" lvl="0" indent="-342900">
+              <a:lnSpc>
+                <a:spcPct val="106000"/>
+              </a:lnSpc>
+              <a:buFont typeface="Symbol" panose="05050102010706020507" pitchFamily="18" charset="2"/>
+              <a:buChar char=""/>
+            </a:pPr>
+            <a:r>
+              <a:rPr lang="sk-SK" sz="1800" dirty="0" err="1">
+                <a:effectLst/>
+                <a:latin typeface="Calibri" panose="020F0502020204030204" pitchFamily="34" charset="0"/>
+                <a:ea typeface="Calibri" panose="020F0502020204030204" pitchFamily="34" charset="0"/>
+                <a:cs typeface="Times New Roman" panose="02020603050405020304" pitchFamily="18" charset="0"/>
+              </a:rPr>
+              <a:t>assertArrayEquals</a:t>
+            </a:r>
+            <a:r>
+              <a:rPr lang="sk-SK" sz="1800" dirty="0">
+                <a:effectLst/>
+                <a:latin typeface="Calibri" panose="020F0502020204030204" pitchFamily="34" charset="0"/>
+                <a:ea typeface="Calibri" panose="020F0502020204030204" pitchFamily="34" charset="0"/>
+                <a:cs typeface="Times New Roman" panose="02020603050405020304" pitchFamily="18" charset="0"/>
+              </a:rPr>
+              <a:t> – Overí, či dve polia sú rovnaké</a:t>
+            </a:r>
+          </a:p>
+          <a:p>
+            <a:pPr marL="342900" lvl="0" indent="-342900">
+              <a:lnSpc>
+                <a:spcPct val="106000"/>
+              </a:lnSpc>
+              <a:buFont typeface="Symbol" panose="05050102010706020507" pitchFamily="18" charset="2"/>
+              <a:buChar char=""/>
+            </a:pPr>
+            <a:r>
+              <a:rPr lang="sk-SK" sz="1800" dirty="0" err="1">
+                <a:effectLst/>
+                <a:latin typeface="Calibri" panose="020F0502020204030204" pitchFamily="34" charset="0"/>
+                <a:ea typeface="Calibri" panose="020F0502020204030204" pitchFamily="34" charset="0"/>
+                <a:cs typeface="Times New Roman" panose="02020603050405020304" pitchFamily="18" charset="0"/>
+              </a:rPr>
+              <a:t>assertIterableEquals</a:t>
+            </a:r>
+            <a:r>
+              <a:rPr lang="sk-SK" sz="1800" dirty="0">
+                <a:effectLst/>
+                <a:latin typeface="Calibri" panose="020F0502020204030204" pitchFamily="34" charset="0"/>
+                <a:ea typeface="Calibri" panose="020F0502020204030204" pitchFamily="34" charset="0"/>
+                <a:cs typeface="Times New Roman" panose="02020603050405020304" pitchFamily="18" charset="0"/>
+              </a:rPr>
+              <a:t> – Overí, či dva </a:t>
+            </a:r>
+            <a:r>
+              <a:rPr lang="sk-SK" sz="1800" dirty="0" err="1">
+                <a:effectLst/>
+                <a:latin typeface="Calibri" panose="020F0502020204030204" pitchFamily="34" charset="0"/>
+                <a:ea typeface="Calibri" panose="020F0502020204030204" pitchFamily="34" charset="0"/>
+                <a:cs typeface="Times New Roman" panose="02020603050405020304" pitchFamily="18" charset="0"/>
+              </a:rPr>
+              <a:t>iterable</a:t>
+            </a:r>
+            <a:r>
+              <a:rPr lang="sk-SK" sz="1800" dirty="0">
+                <a:effectLst/>
+                <a:latin typeface="Calibri" panose="020F0502020204030204" pitchFamily="34" charset="0"/>
+                <a:ea typeface="Calibri" panose="020F0502020204030204" pitchFamily="34" charset="0"/>
+                <a:cs typeface="Times New Roman" panose="02020603050405020304" pitchFamily="18" charset="0"/>
+              </a:rPr>
+              <a:t> sú rovnaké</a:t>
+            </a:r>
+          </a:p>
+          <a:p>
+            <a:pPr marL="342900" lvl="0" indent="-342900">
+              <a:lnSpc>
+                <a:spcPct val="106000"/>
+              </a:lnSpc>
+              <a:buFont typeface="Symbol" panose="05050102010706020507" pitchFamily="18" charset="2"/>
+              <a:buChar char=""/>
+            </a:pPr>
+            <a:r>
+              <a:rPr lang="sk-SK" sz="1800" dirty="0" err="1">
+                <a:effectLst/>
+                <a:latin typeface="Calibri" panose="020F0502020204030204" pitchFamily="34" charset="0"/>
+                <a:ea typeface="Calibri" panose="020F0502020204030204" pitchFamily="34" charset="0"/>
+                <a:cs typeface="Times New Roman" panose="02020603050405020304" pitchFamily="18" charset="0"/>
+              </a:rPr>
+              <a:t>assertThrows</a:t>
+            </a:r>
+            <a:r>
+              <a:rPr lang="sk-SK" sz="1800" dirty="0">
+                <a:effectLst/>
+                <a:latin typeface="Calibri" panose="020F0502020204030204" pitchFamily="34" charset="0"/>
+                <a:ea typeface="Calibri" panose="020F0502020204030204" pitchFamily="34" charset="0"/>
+                <a:cs typeface="Times New Roman" panose="02020603050405020304" pitchFamily="18" charset="0"/>
+              </a:rPr>
+              <a:t> – Overí, či funkcia na vstupe vyhodí správnu výnimku</a:t>
+            </a:r>
+          </a:p>
+          <a:p>
+            <a:pPr marL="342900" lvl="0" indent="-342900">
+              <a:lnSpc>
+                <a:spcPct val="106000"/>
+              </a:lnSpc>
+              <a:buFont typeface="Symbol" panose="05050102010706020507" pitchFamily="18" charset="2"/>
+              <a:buChar char=""/>
+            </a:pPr>
+            <a:r>
+              <a:rPr lang="sk-SK" sz="1800" dirty="0" err="1">
+                <a:effectLst/>
+                <a:latin typeface="Calibri" panose="020F0502020204030204" pitchFamily="34" charset="0"/>
+                <a:ea typeface="Calibri" panose="020F0502020204030204" pitchFamily="34" charset="0"/>
+                <a:cs typeface="Times New Roman" panose="02020603050405020304" pitchFamily="18" charset="0"/>
+              </a:rPr>
+              <a:t>assertDoesNotThrow</a:t>
+            </a:r>
+            <a:r>
+              <a:rPr lang="sk-SK" sz="1800" dirty="0">
+                <a:effectLst/>
+                <a:latin typeface="Calibri" panose="020F0502020204030204" pitchFamily="34" charset="0"/>
+                <a:ea typeface="Calibri" panose="020F0502020204030204" pitchFamily="34" charset="0"/>
+                <a:cs typeface="Times New Roman" panose="02020603050405020304" pitchFamily="18" charset="0"/>
+              </a:rPr>
+              <a:t> – Opačná metóda k </a:t>
+            </a:r>
+            <a:r>
+              <a:rPr lang="sk-SK" sz="1800" dirty="0" err="1">
+                <a:effectLst/>
+                <a:latin typeface="Calibri" panose="020F0502020204030204" pitchFamily="34" charset="0"/>
+                <a:ea typeface="Calibri" panose="020F0502020204030204" pitchFamily="34" charset="0"/>
+                <a:cs typeface="Times New Roman" panose="02020603050405020304" pitchFamily="18" charset="0"/>
+              </a:rPr>
+              <a:t>assertThrows</a:t>
+            </a:r>
+            <a:endParaRPr lang="sk-SK" sz="1800" dirty="0">
+              <a:effectLst/>
+              <a:latin typeface="Calibri" panose="020F0502020204030204" pitchFamily="34" charset="0"/>
+              <a:ea typeface="Calibri" panose="020F0502020204030204" pitchFamily="34" charset="0"/>
+              <a:cs typeface="Times New Roman" panose="02020603050405020304" pitchFamily="18" charset="0"/>
+            </a:endParaRPr>
+          </a:p>
+          <a:p>
+            <a:pPr marL="342900" lvl="0" indent="-342900">
+              <a:lnSpc>
+                <a:spcPct val="106000"/>
+              </a:lnSpc>
+              <a:buFont typeface="Symbol" panose="05050102010706020507" pitchFamily="18" charset="2"/>
+              <a:buChar char=""/>
+            </a:pPr>
+            <a:r>
+              <a:rPr lang="sk-SK" sz="1800" dirty="0" err="1">
+                <a:effectLst/>
+                <a:latin typeface="Calibri" panose="020F0502020204030204" pitchFamily="34" charset="0"/>
+                <a:ea typeface="Calibri" panose="020F0502020204030204" pitchFamily="34" charset="0"/>
+                <a:cs typeface="Times New Roman" panose="02020603050405020304" pitchFamily="18" charset="0"/>
+              </a:rPr>
+              <a:t>assertTimeout</a:t>
+            </a:r>
+            <a:r>
+              <a:rPr lang="sk-SK" sz="1800" dirty="0">
+                <a:effectLst/>
+                <a:latin typeface="Calibri" panose="020F0502020204030204" pitchFamily="34" charset="0"/>
+                <a:ea typeface="Calibri" panose="020F0502020204030204" pitchFamily="34" charset="0"/>
+                <a:cs typeface="Times New Roman" panose="02020603050405020304" pitchFamily="18" charset="0"/>
+              </a:rPr>
+              <a:t> – Overí, či vstupná funkcia skončí pred špecifikovaným </a:t>
+            </a:r>
+            <a:r>
+              <a:rPr lang="sk-SK" sz="1800" dirty="0" err="1">
+                <a:effectLst/>
+                <a:latin typeface="Calibri" panose="020F0502020204030204" pitchFamily="34" charset="0"/>
+                <a:ea typeface="Calibri" panose="020F0502020204030204" pitchFamily="34" charset="0"/>
+                <a:cs typeface="Times New Roman" panose="02020603050405020304" pitchFamily="18" charset="0"/>
+              </a:rPr>
+              <a:t>timeoutom</a:t>
+            </a:r>
+            <a:endParaRPr lang="sk-SK" sz="1800" dirty="0">
+              <a:effectLst/>
+              <a:latin typeface="Calibri" panose="020F0502020204030204" pitchFamily="34" charset="0"/>
+              <a:ea typeface="Calibri" panose="020F0502020204030204" pitchFamily="34" charset="0"/>
+              <a:cs typeface="Times New Roman" panose="02020603050405020304" pitchFamily="18" charset="0"/>
+            </a:endParaRPr>
+          </a:p>
+          <a:p>
+            <a:pPr marL="342900" lvl="0" indent="-342900">
+              <a:lnSpc>
+                <a:spcPct val="106000"/>
+              </a:lnSpc>
+              <a:buFont typeface="Symbol" panose="05050102010706020507" pitchFamily="18" charset="2"/>
+              <a:buChar char=""/>
+            </a:pPr>
+            <a:r>
+              <a:rPr lang="sk-SK" sz="1800" dirty="0" err="1">
+                <a:effectLst/>
+                <a:latin typeface="Calibri" panose="020F0502020204030204" pitchFamily="34" charset="0"/>
+                <a:ea typeface="Calibri" panose="020F0502020204030204" pitchFamily="34" charset="0"/>
+                <a:cs typeface="Times New Roman" panose="02020603050405020304" pitchFamily="18" charset="0"/>
+              </a:rPr>
+              <a:t>assertAll</a:t>
+            </a:r>
+            <a:r>
+              <a:rPr lang="sk-SK" sz="1800" dirty="0">
+                <a:effectLst/>
+                <a:latin typeface="Calibri" panose="020F0502020204030204" pitchFamily="34" charset="0"/>
+                <a:ea typeface="Calibri" panose="020F0502020204030204" pitchFamily="34" charset="0"/>
+                <a:cs typeface="Times New Roman" panose="02020603050405020304" pitchFamily="18" charset="0"/>
+              </a:rPr>
+              <a:t> – Táto funkcia umožňuje vytvorenie skupinových </a:t>
+            </a:r>
+            <a:r>
+              <a:rPr lang="sk-SK" sz="1800" dirty="0" err="1">
+                <a:effectLst/>
+                <a:latin typeface="Calibri" panose="020F0502020204030204" pitchFamily="34" charset="0"/>
+                <a:ea typeface="Calibri" panose="020F0502020204030204" pitchFamily="34" charset="0"/>
+                <a:cs typeface="Times New Roman" panose="02020603050405020304" pitchFamily="18" charset="0"/>
+              </a:rPr>
+              <a:t>asertions</a:t>
+            </a:r>
+            <a:r>
+              <a:rPr lang="sk-SK" sz="1800" dirty="0">
+                <a:effectLst/>
+                <a:latin typeface="Calibri" panose="020F0502020204030204" pitchFamily="34" charset="0"/>
+                <a:ea typeface="Calibri" panose="020F0502020204030204" pitchFamily="34" charset="0"/>
+                <a:cs typeface="Times New Roman" panose="02020603050405020304" pitchFamily="18" charset="0"/>
+              </a:rPr>
+              <a:t>, kde sa spustí každá </a:t>
+            </a:r>
+            <a:r>
+              <a:rPr lang="sk-SK" sz="1800" dirty="0" err="1">
+                <a:effectLst/>
+                <a:latin typeface="Calibri" panose="020F0502020204030204" pitchFamily="34" charset="0"/>
+                <a:ea typeface="Calibri" panose="020F0502020204030204" pitchFamily="34" charset="0"/>
+                <a:cs typeface="Times New Roman" panose="02020603050405020304" pitchFamily="18" charset="0"/>
+              </a:rPr>
+              <a:t>assertion</a:t>
+            </a:r>
+            <a:r>
+              <a:rPr lang="sk-SK" sz="1800" dirty="0">
+                <a:effectLst/>
+                <a:latin typeface="Calibri" panose="020F0502020204030204" pitchFamily="34" charset="0"/>
+                <a:ea typeface="Calibri" panose="020F0502020204030204" pitchFamily="34" charset="0"/>
+                <a:cs typeface="Times New Roman" panose="02020603050405020304" pitchFamily="18" charset="0"/>
+              </a:rPr>
+              <a:t> a ich zlyhania sú hlásené spoločne.</a:t>
+            </a:r>
+          </a:p>
+          <a:p>
+            <a:pPr marL="342900" lvl="0" indent="-342900">
+              <a:lnSpc>
+                <a:spcPct val="106000"/>
+              </a:lnSpc>
+              <a:spcAft>
+                <a:spcPts val="800"/>
+              </a:spcAft>
+              <a:buFont typeface="Symbol" panose="05050102010706020507" pitchFamily="18" charset="2"/>
+              <a:buChar char=""/>
+            </a:pPr>
+            <a:r>
+              <a:rPr lang="sk-SK" sz="1800" dirty="0" err="1">
+                <a:effectLst/>
+                <a:latin typeface="Calibri" panose="020F0502020204030204" pitchFamily="34" charset="0"/>
+                <a:ea typeface="Calibri" panose="020F0502020204030204" pitchFamily="34" charset="0"/>
+                <a:cs typeface="Times New Roman" panose="02020603050405020304" pitchFamily="18" charset="0"/>
+              </a:rPr>
+              <a:t>fail</a:t>
+            </a:r>
+            <a:r>
+              <a:rPr lang="sk-SK" sz="1800" dirty="0">
+                <a:effectLst/>
+                <a:latin typeface="Calibri" panose="020F0502020204030204" pitchFamily="34" charset="0"/>
+                <a:ea typeface="Calibri" panose="020F0502020204030204" pitchFamily="34" charset="0"/>
+                <a:cs typeface="Times New Roman" panose="02020603050405020304" pitchFamily="18" charset="0"/>
+              </a:rPr>
+              <a:t> – táto metóda spôsobí zlyhanie testu</a:t>
+            </a:r>
+          </a:p>
+          <a:p>
+            <a:endParaRPr lang="sk-SK" dirty="0"/>
           </a:p>
         </p:txBody>
       </p:sp>
     </p:spTree>
     <p:extLst>
       <p:ext uri="{BB962C8B-B14F-4D97-AF65-F5344CB8AC3E}">
-        <p14:creationId xmlns:p14="http://schemas.microsoft.com/office/powerpoint/2010/main" val="669809993"/>
+        <p14:creationId xmlns:p14="http://schemas.microsoft.com/office/powerpoint/2010/main" val="2649344561"/>
       </p:ext>
     </p:extLst>
   </p:cSld>

</xml_diff>